<commit_message>
lab05 file exercises - file copy exercise solution
</commit_message>
<xml_diff>
--- a/lab05-files.pptx
+++ b/lab05-files.pptx
@@ -8,6 +8,7 @@
     <p:sldId id="257" r:id="rId2"/>
     <p:sldId id="258" r:id="rId3"/>
     <p:sldId id="259" r:id="rId4"/>
+    <p:sldId id="260" r:id="rId5"/>
   </p:sldIdLst>
   <p:sldSz cx="12192000" cy="6858000"/>
   <p:notesSz cx="6858000" cy="9144000"/>
@@ -106,6 +107,11 @@
       </a:defRPr>
     </a:lvl9pPr>
   </p:defaultTextStyle>
+  <p:extLst>
+    <p:ext uri="{EFAFB233-063F-42B5-8137-9DF3F51BA10A}">
+      <p15:sldGuideLst xmlns:p15="http://schemas.microsoft.com/office/powerpoint/2012/main"/>
+    </p:ext>
+  </p:extLst>
 </p:presentation>
 </file>
 
@@ -256,7 +262,7 @@
           <a:p>
             <a:fld id="{F8A20F0D-E551-224B-8808-44A3388586FE}" type="datetimeFigureOut">
               <a:rPr lang="en-US" smtClean="0"/>
-              <a:t>6/5/19</a:t>
+              <a:t>6/12/19</a:t>
             </a:fld>
             <a:endParaRPr lang="en-US"/>
           </a:p>
@@ -454,7 +460,7 @@
           <a:p>
             <a:fld id="{F8A20F0D-E551-224B-8808-44A3388586FE}" type="datetimeFigureOut">
               <a:rPr lang="en-US" smtClean="0"/>
-              <a:t>6/5/19</a:t>
+              <a:t>6/12/19</a:t>
             </a:fld>
             <a:endParaRPr lang="en-US"/>
           </a:p>
@@ -662,7 +668,7 @@
           <a:p>
             <a:fld id="{F8A20F0D-E551-224B-8808-44A3388586FE}" type="datetimeFigureOut">
               <a:rPr lang="en-US" smtClean="0"/>
-              <a:t>6/5/19</a:t>
+              <a:t>6/12/19</a:t>
             </a:fld>
             <a:endParaRPr lang="en-US"/>
           </a:p>
@@ -860,7 +866,7 @@
           <a:p>
             <a:fld id="{F8A20F0D-E551-224B-8808-44A3388586FE}" type="datetimeFigureOut">
               <a:rPr lang="en-US" smtClean="0"/>
-              <a:t>6/5/19</a:t>
+              <a:t>6/12/19</a:t>
             </a:fld>
             <a:endParaRPr lang="en-US"/>
           </a:p>
@@ -1135,7 +1141,7 @@
           <a:p>
             <a:fld id="{F8A20F0D-E551-224B-8808-44A3388586FE}" type="datetimeFigureOut">
               <a:rPr lang="en-US" smtClean="0"/>
-              <a:t>6/5/19</a:t>
+              <a:t>6/12/19</a:t>
             </a:fld>
             <a:endParaRPr lang="en-US"/>
           </a:p>
@@ -1400,7 +1406,7 @@
           <a:p>
             <a:fld id="{F8A20F0D-E551-224B-8808-44A3388586FE}" type="datetimeFigureOut">
               <a:rPr lang="en-US" smtClean="0"/>
-              <a:t>6/5/19</a:t>
+              <a:t>6/12/19</a:t>
             </a:fld>
             <a:endParaRPr lang="en-US"/>
           </a:p>
@@ -1812,7 +1818,7 @@
           <a:p>
             <a:fld id="{F8A20F0D-E551-224B-8808-44A3388586FE}" type="datetimeFigureOut">
               <a:rPr lang="en-US" smtClean="0"/>
-              <a:t>6/5/19</a:t>
+              <a:t>6/12/19</a:t>
             </a:fld>
             <a:endParaRPr lang="en-US"/>
           </a:p>
@@ -1953,7 +1959,7 @@
           <a:p>
             <a:fld id="{F8A20F0D-E551-224B-8808-44A3388586FE}" type="datetimeFigureOut">
               <a:rPr lang="en-US" smtClean="0"/>
-              <a:t>6/5/19</a:t>
+              <a:t>6/12/19</a:t>
             </a:fld>
             <a:endParaRPr lang="en-US"/>
           </a:p>
@@ -2066,7 +2072,7 @@
           <a:p>
             <a:fld id="{F8A20F0D-E551-224B-8808-44A3388586FE}" type="datetimeFigureOut">
               <a:rPr lang="en-US" smtClean="0"/>
-              <a:t>6/5/19</a:t>
+              <a:t>6/12/19</a:t>
             </a:fld>
             <a:endParaRPr lang="en-US"/>
           </a:p>
@@ -2377,7 +2383,7 @@
           <a:p>
             <a:fld id="{F8A20F0D-E551-224B-8808-44A3388586FE}" type="datetimeFigureOut">
               <a:rPr lang="en-US" smtClean="0"/>
-              <a:t>6/5/19</a:t>
+              <a:t>6/12/19</a:t>
             </a:fld>
             <a:endParaRPr lang="en-US"/>
           </a:p>
@@ -2665,7 +2671,7 @@
           <a:p>
             <a:fld id="{F8A20F0D-E551-224B-8808-44A3388586FE}" type="datetimeFigureOut">
               <a:rPr lang="en-US" smtClean="0"/>
-              <a:t>6/5/19</a:t>
+              <a:t>6/12/19</a:t>
             </a:fld>
             <a:endParaRPr lang="en-US"/>
           </a:p>
@@ -2906,7 +2912,7 @@
           <a:p>
             <a:fld id="{F8A20F0D-E551-224B-8808-44A3388586FE}" type="datetimeFigureOut">
               <a:rPr lang="en-US" smtClean="0"/>
-              <a:t>6/5/19</a:t>
+              <a:t>6/12/19</a:t>
             </a:fld>
             <a:endParaRPr lang="en-US"/>
           </a:p>
@@ -3748,6 +3754,119 @@
 </p:sld>
 </file>
 
+<file path=ppt/slides/slide4.xml><?xml version="1.0" encoding="utf-8"?>
+<p:sld xmlns:a="http://schemas.openxmlformats.org/drawingml/2006/main" xmlns:r="http://schemas.openxmlformats.org/officeDocument/2006/relationships" xmlns:p="http://schemas.openxmlformats.org/presentationml/2006/main">
+  <p:cSld>
+    <p:spTree>
+      <p:nvGrpSpPr>
+        <p:cNvPr id="1" name=""/>
+        <p:cNvGrpSpPr/>
+        <p:nvPr/>
+      </p:nvGrpSpPr>
+      <p:grpSpPr>
+        <a:xfrm>
+          <a:off x="0" y="0"/>
+          <a:ext cx="0" cy="0"/>
+          <a:chOff x="0" y="0"/>
+          <a:chExt cx="0" cy="0"/>
+        </a:xfrm>
+      </p:grpSpPr>
+      <p:sp>
+        <p:nvSpPr>
+          <p:cNvPr id="3" name="Content Placeholder 2">
+            <a:extLst>
+              <a:ext uri="{FF2B5EF4-FFF2-40B4-BE49-F238E27FC236}">
+                <a16:creationId xmlns:a16="http://schemas.microsoft.com/office/drawing/2014/main" id="{CB749A0F-5B33-9542-8F03-72DD9467896D}"/>
+              </a:ext>
+            </a:extLst>
+          </p:cNvPr>
+          <p:cNvSpPr>
+            <a:spLocks noGrp="1"/>
+          </p:cNvSpPr>
+          <p:nvPr>
+            <p:ph idx="1"/>
+          </p:nvPr>
+        </p:nvSpPr>
+        <p:spPr>
+          <a:xfrm>
+            <a:off x="838200" y="178676"/>
+            <a:ext cx="10515600" cy="6495393"/>
+          </a:xfrm>
+        </p:spPr>
+        <p:txBody>
+          <a:bodyPr>
+            <a:normAutofit/>
+          </a:bodyPr>
+          <a:lstStyle/>
+          <a:p>
+            <a:pPr marL="0" indent="0">
+              <a:buNone/>
+            </a:pPr>
+            <a:r>
+              <a:rPr lang="en-US" dirty="0"/>
+              <a:t>Program 4: </a:t>
+            </a:r>
+            <a:r>
+              <a:rPr lang="en-US" b="1" dirty="0"/>
+              <a:t>Copying file A to file B</a:t>
+            </a:r>
+          </a:p>
+          <a:p>
+            <a:pPr marL="0" indent="0">
+              <a:buNone/>
+            </a:pPr>
+            <a:endParaRPr lang="en-US" b="1" dirty="0"/>
+          </a:p>
+          <a:p>
+            <a:r>
+              <a:rPr lang="en-US" sz="2000" dirty="0">
+                <a:latin typeface="Courier New" panose="02070309020205020404" pitchFamily="49" charset="0"/>
+                <a:cs typeface="Courier New" panose="02070309020205020404" pitchFamily="49" charset="0"/>
+              </a:rPr>
+              <a:t>Write a program that will prompt the user for the names of input and output files.  It will then copy the input file to the output file by byte-by-byte. </a:t>
+            </a:r>
+          </a:p>
+          <a:p>
+            <a:r>
+              <a:rPr lang="en-US" sz="2000" dirty="0">
+                <a:latin typeface="Courier New" panose="02070309020205020404" pitchFamily="49" charset="0"/>
+                <a:cs typeface="Courier New" panose="02070309020205020404" pitchFamily="49" charset="0"/>
+              </a:rPr>
+              <a:t>After the program completes, compare whether the input and out files are identical in </a:t>
+            </a:r>
+            <a:r>
+              <a:rPr lang="en-US" sz="2000" dirty="0" err="1">
+                <a:latin typeface="Courier New" panose="02070309020205020404" pitchFamily="49" charset="0"/>
+                <a:cs typeface="Courier New" panose="02070309020205020404" pitchFamily="49" charset="0"/>
+              </a:rPr>
+              <a:t>CLion</a:t>
+            </a:r>
+            <a:endParaRPr lang="en-US" sz="2000" dirty="0">
+              <a:latin typeface="Courier New" panose="02070309020205020404" pitchFamily="49" charset="0"/>
+              <a:cs typeface="Courier New" panose="02070309020205020404" pitchFamily="49" charset="0"/>
+            </a:endParaRPr>
+          </a:p>
+          <a:p>
+            <a:pPr marL="0" indent="0">
+              <a:buNone/>
+            </a:pPr>
+            <a:endParaRPr lang="en-US" dirty="0"/>
+          </a:p>
+        </p:txBody>
+      </p:sp>
+    </p:spTree>
+    <p:extLst>
+      <p:ext uri="{BB962C8B-B14F-4D97-AF65-F5344CB8AC3E}">
+        <p14:creationId xmlns:p14="http://schemas.microsoft.com/office/powerpoint/2010/main" val="3335507052"/>
+      </p:ext>
+    </p:extLst>
+  </p:cSld>
+  <p:clrMapOvr>
+    <a:masterClrMapping/>
+  </p:clrMapOvr>
+</p:sld>
+</file>
+
 <file path=ppt/theme/theme1.xml><?xml version="1.0" encoding="utf-8"?>
 <a:theme xmlns:a="http://schemas.openxmlformats.org/drawingml/2006/main" name="Office Theme">
   <a:themeElements>

</xml_diff>

<commit_message>
lab05 file exercises - file copy exercise being added
</commit_message>
<xml_diff>
--- a/lab05-files.pptx
+++ b/lab05-files.pptx
@@ -8,6 +8,7 @@
     <p:sldId id="257" r:id="rId2"/>
     <p:sldId id="258" r:id="rId3"/>
     <p:sldId id="259" r:id="rId4"/>
+    <p:sldId id="260" r:id="rId5"/>
   </p:sldIdLst>
   <p:sldSz cx="12192000" cy="6858000"/>
   <p:notesSz cx="6858000" cy="9144000"/>
@@ -106,6 +107,11 @@
       </a:defRPr>
     </a:lvl9pPr>
   </p:defaultTextStyle>
+  <p:extLst>
+    <p:ext uri="{EFAFB233-063F-42B5-8137-9DF3F51BA10A}">
+      <p15:sldGuideLst xmlns:p15="http://schemas.microsoft.com/office/powerpoint/2012/main"/>
+    </p:ext>
+  </p:extLst>
 </p:presentation>
 </file>
 
@@ -256,7 +262,7 @@
           <a:p>
             <a:fld id="{F8A20F0D-E551-224B-8808-44A3388586FE}" type="datetimeFigureOut">
               <a:rPr lang="en-US" smtClean="0"/>
-              <a:t>6/5/19</a:t>
+              <a:t>6/12/19</a:t>
             </a:fld>
             <a:endParaRPr lang="en-US"/>
           </a:p>
@@ -454,7 +460,7 @@
           <a:p>
             <a:fld id="{F8A20F0D-E551-224B-8808-44A3388586FE}" type="datetimeFigureOut">
               <a:rPr lang="en-US" smtClean="0"/>
-              <a:t>6/5/19</a:t>
+              <a:t>6/12/19</a:t>
             </a:fld>
             <a:endParaRPr lang="en-US"/>
           </a:p>
@@ -662,7 +668,7 @@
           <a:p>
             <a:fld id="{F8A20F0D-E551-224B-8808-44A3388586FE}" type="datetimeFigureOut">
               <a:rPr lang="en-US" smtClean="0"/>
-              <a:t>6/5/19</a:t>
+              <a:t>6/12/19</a:t>
             </a:fld>
             <a:endParaRPr lang="en-US"/>
           </a:p>
@@ -860,7 +866,7 @@
           <a:p>
             <a:fld id="{F8A20F0D-E551-224B-8808-44A3388586FE}" type="datetimeFigureOut">
               <a:rPr lang="en-US" smtClean="0"/>
-              <a:t>6/5/19</a:t>
+              <a:t>6/12/19</a:t>
             </a:fld>
             <a:endParaRPr lang="en-US"/>
           </a:p>
@@ -1135,7 +1141,7 @@
           <a:p>
             <a:fld id="{F8A20F0D-E551-224B-8808-44A3388586FE}" type="datetimeFigureOut">
               <a:rPr lang="en-US" smtClean="0"/>
-              <a:t>6/5/19</a:t>
+              <a:t>6/12/19</a:t>
             </a:fld>
             <a:endParaRPr lang="en-US"/>
           </a:p>
@@ -1400,7 +1406,7 @@
           <a:p>
             <a:fld id="{F8A20F0D-E551-224B-8808-44A3388586FE}" type="datetimeFigureOut">
               <a:rPr lang="en-US" smtClean="0"/>
-              <a:t>6/5/19</a:t>
+              <a:t>6/12/19</a:t>
             </a:fld>
             <a:endParaRPr lang="en-US"/>
           </a:p>
@@ -1812,7 +1818,7 @@
           <a:p>
             <a:fld id="{F8A20F0D-E551-224B-8808-44A3388586FE}" type="datetimeFigureOut">
               <a:rPr lang="en-US" smtClean="0"/>
-              <a:t>6/5/19</a:t>
+              <a:t>6/12/19</a:t>
             </a:fld>
             <a:endParaRPr lang="en-US"/>
           </a:p>
@@ -1953,7 +1959,7 @@
           <a:p>
             <a:fld id="{F8A20F0D-E551-224B-8808-44A3388586FE}" type="datetimeFigureOut">
               <a:rPr lang="en-US" smtClean="0"/>
-              <a:t>6/5/19</a:t>
+              <a:t>6/12/19</a:t>
             </a:fld>
             <a:endParaRPr lang="en-US"/>
           </a:p>
@@ -2066,7 +2072,7 @@
           <a:p>
             <a:fld id="{F8A20F0D-E551-224B-8808-44A3388586FE}" type="datetimeFigureOut">
               <a:rPr lang="en-US" smtClean="0"/>
-              <a:t>6/5/19</a:t>
+              <a:t>6/12/19</a:t>
             </a:fld>
             <a:endParaRPr lang="en-US"/>
           </a:p>
@@ -2377,7 +2383,7 @@
           <a:p>
             <a:fld id="{F8A20F0D-E551-224B-8808-44A3388586FE}" type="datetimeFigureOut">
               <a:rPr lang="en-US" smtClean="0"/>
-              <a:t>6/5/19</a:t>
+              <a:t>6/12/19</a:t>
             </a:fld>
             <a:endParaRPr lang="en-US"/>
           </a:p>
@@ -2665,7 +2671,7 @@
           <a:p>
             <a:fld id="{F8A20F0D-E551-224B-8808-44A3388586FE}" type="datetimeFigureOut">
               <a:rPr lang="en-US" smtClean="0"/>
-              <a:t>6/5/19</a:t>
+              <a:t>6/12/19</a:t>
             </a:fld>
             <a:endParaRPr lang="en-US"/>
           </a:p>
@@ -2906,7 +2912,7 @@
           <a:p>
             <a:fld id="{F8A20F0D-E551-224B-8808-44A3388586FE}" type="datetimeFigureOut">
               <a:rPr lang="en-US" smtClean="0"/>
-              <a:t>6/5/19</a:t>
+              <a:t>6/12/19</a:t>
             </a:fld>
             <a:endParaRPr lang="en-US"/>
           </a:p>
@@ -3748,6 +3754,119 @@
 </p:sld>
 </file>
 
+<file path=ppt/slides/slide4.xml><?xml version="1.0" encoding="utf-8"?>
+<p:sld xmlns:a="http://schemas.openxmlformats.org/drawingml/2006/main" xmlns:r="http://schemas.openxmlformats.org/officeDocument/2006/relationships" xmlns:p="http://schemas.openxmlformats.org/presentationml/2006/main">
+  <p:cSld>
+    <p:spTree>
+      <p:nvGrpSpPr>
+        <p:cNvPr id="1" name=""/>
+        <p:cNvGrpSpPr/>
+        <p:nvPr/>
+      </p:nvGrpSpPr>
+      <p:grpSpPr>
+        <a:xfrm>
+          <a:off x="0" y="0"/>
+          <a:ext cx="0" cy="0"/>
+          <a:chOff x="0" y="0"/>
+          <a:chExt cx="0" cy="0"/>
+        </a:xfrm>
+      </p:grpSpPr>
+      <p:sp>
+        <p:nvSpPr>
+          <p:cNvPr id="3" name="Content Placeholder 2">
+            <a:extLst>
+              <a:ext uri="{FF2B5EF4-FFF2-40B4-BE49-F238E27FC236}">
+                <a16:creationId xmlns:a16="http://schemas.microsoft.com/office/drawing/2014/main" id="{CB749A0F-5B33-9542-8F03-72DD9467896D}"/>
+              </a:ext>
+            </a:extLst>
+          </p:cNvPr>
+          <p:cNvSpPr>
+            <a:spLocks noGrp="1"/>
+          </p:cNvSpPr>
+          <p:nvPr>
+            <p:ph idx="1"/>
+          </p:nvPr>
+        </p:nvSpPr>
+        <p:spPr>
+          <a:xfrm>
+            <a:off x="838200" y="178676"/>
+            <a:ext cx="10515600" cy="6495393"/>
+          </a:xfrm>
+        </p:spPr>
+        <p:txBody>
+          <a:bodyPr>
+            <a:normAutofit/>
+          </a:bodyPr>
+          <a:lstStyle/>
+          <a:p>
+            <a:pPr marL="0" indent="0">
+              <a:buNone/>
+            </a:pPr>
+            <a:r>
+              <a:rPr lang="en-US" dirty="0"/>
+              <a:t>Program 4: </a:t>
+            </a:r>
+            <a:r>
+              <a:rPr lang="en-US" b="1" dirty="0"/>
+              <a:t>Copying file A to file B</a:t>
+            </a:r>
+          </a:p>
+          <a:p>
+            <a:pPr marL="0" indent="0">
+              <a:buNone/>
+            </a:pPr>
+            <a:endParaRPr lang="en-US" b="1" dirty="0"/>
+          </a:p>
+          <a:p>
+            <a:r>
+              <a:rPr lang="en-US" dirty="0">
+                <a:latin typeface="Courier New" panose="02070309020205020404" pitchFamily="49" charset="0"/>
+                <a:cs typeface="Courier New" panose="02070309020205020404" pitchFamily="49" charset="0"/>
+              </a:rPr>
+              <a:t>Write a program that will prompt the user for the names of input and output files.  It will then copy the input file to the output file by byte-by-byte. </a:t>
+            </a:r>
+          </a:p>
+          <a:p>
+            <a:r>
+              <a:rPr lang="en-US" dirty="0">
+                <a:latin typeface="Courier New" panose="02070309020205020404" pitchFamily="49" charset="0"/>
+                <a:cs typeface="Courier New" panose="02070309020205020404" pitchFamily="49" charset="0"/>
+              </a:rPr>
+              <a:t>After the program completes, compare whether the input and out files are identical in </a:t>
+            </a:r>
+            <a:r>
+              <a:rPr lang="en-US" dirty="0" err="1">
+                <a:latin typeface="Courier New" panose="02070309020205020404" pitchFamily="49" charset="0"/>
+                <a:cs typeface="Courier New" panose="02070309020205020404" pitchFamily="49" charset="0"/>
+              </a:rPr>
+              <a:t>CLion</a:t>
+            </a:r>
+            <a:endParaRPr lang="en-US">
+              <a:latin typeface="Courier New" panose="02070309020205020404" pitchFamily="49" charset="0"/>
+              <a:cs typeface="Courier New" panose="02070309020205020404" pitchFamily="49" charset="0"/>
+            </a:endParaRPr>
+          </a:p>
+          <a:p>
+            <a:pPr marL="0" indent="0">
+              <a:buNone/>
+            </a:pPr>
+            <a:endParaRPr lang="en-US" dirty="0"/>
+          </a:p>
+        </p:txBody>
+      </p:sp>
+    </p:spTree>
+    <p:extLst>
+      <p:ext uri="{BB962C8B-B14F-4D97-AF65-F5344CB8AC3E}">
+        <p14:creationId xmlns:p14="http://schemas.microsoft.com/office/powerpoint/2010/main" val="601842702"/>
+      </p:ext>
+    </p:extLst>
+  </p:cSld>
+  <p:clrMapOvr>
+    <a:masterClrMapping/>
+  </p:clrMapOvr>
+</p:sld>
+</file>
+
 <file path=ppt/theme/theme1.xml><?xml version="1.0" encoding="utf-8"?>
 <a:theme xmlns:a="http://schemas.openxmlformats.org/drawingml/2006/main" name="Office Theme">
   <a:themeElements>

</xml_diff>